<commit_message>
Revised Version: Working version 20140807
</commit_message>
<xml_diff>
--- a/appendix/genImagesExamples.pptx
+++ b/appendix/genImagesExamples.pptx
@@ -8,6 +8,8 @@
     <p:sldId id="256" r:id="rId2"/>
     <p:sldId id="257" r:id="rId3"/>
     <p:sldId id="258" r:id="rId4"/>
+    <p:sldId id="259" r:id="rId5"/>
+    <p:sldId id="260" r:id="rId6"/>
   </p:sldIdLst>
   <p:sldSz cx="9144000" cy="6858000" type="screen4x3"/>
   <p:notesSz cx="6858000" cy="9144000"/>
@@ -4289,14 +4291,14 @@
             <a:noFill/>
           </a:ln>
           <a:extLst>
-            <a:ext uri="{909E8E84-426E-40DD-AFC4-6F175D3DCCD1}">
+            <a:ext uri="{909E8E84-426E-40dd-AFC4-6F175D3DCCD1}">
               <a14:hiddenFill xmlns:a14="http://schemas.microsoft.com/office/drawing/2010/main">
                 <a:solidFill>
                   <a:schemeClr val="accent1"/>
                 </a:solidFill>
               </a14:hiddenFill>
             </a:ext>
-            <a:ext uri="{91240B29-F687-4F45-9708-019B960494DF}">
+            <a:ext uri="{91240B29-F687-4f45-9708-019B960494DF}">
               <a14:hiddenLine xmlns:a14="http://schemas.microsoft.com/office/drawing/2010/main" w="9525">
                 <a:solidFill>
                   <a:schemeClr val="tx1"/>
@@ -4527,6 +4529,1792 @@
     <p:extLst>
       <p:ext uri="{BB962C8B-B14F-4D97-AF65-F5344CB8AC3E}">
         <p14:creationId xmlns:p14="http://schemas.microsoft.com/office/powerpoint/2010/main" val="2553717158"/>
+      </p:ext>
+    </p:extLst>
+  </p:cSld>
+  <p:clrMapOvr>
+    <a:masterClrMapping/>
+  </p:clrMapOvr>
+</p:sld>
+</file>
+
+<file path=ppt/slides/slide4.xml><?xml version="1.0" encoding="utf-8"?>
+<p:sld xmlns:a="http://schemas.openxmlformats.org/drawingml/2006/main" xmlns:r="http://schemas.openxmlformats.org/officeDocument/2006/relationships" xmlns:p="http://schemas.openxmlformats.org/presentationml/2006/main">
+  <p:cSld>
+    <p:spTree>
+      <p:nvGrpSpPr>
+        <p:cNvPr id="1" name=""/>
+        <p:cNvGrpSpPr/>
+        <p:nvPr/>
+      </p:nvGrpSpPr>
+      <p:grpSpPr>
+        <a:xfrm>
+          <a:off x="0" y="0"/>
+          <a:ext cx="0" cy="0"/>
+          <a:chOff x="0" y="0"/>
+          <a:chExt cx="0" cy="0"/>
+        </a:xfrm>
+      </p:grpSpPr>
+      <p:sp>
+        <p:nvSpPr>
+          <p:cNvPr id="4" name="矩形 3"/>
+          <p:cNvSpPr/>
+          <p:nvPr/>
+        </p:nvSpPr>
+        <p:spPr>
+          <a:xfrm>
+            <a:off x="2598553" y="2621971"/>
+            <a:ext cx="648072" cy="360040"/>
+          </a:xfrm>
+          <a:prstGeom prst="rect">
+            <a:avLst/>
+          </a:prstGeom>
+        </p:spPr>
+        <p:style>
+          <a:lnRef idx="2">
+            <a:schemeClr val="accent3">
+              <a:shade val="50000"/>
+            </a:schemeClr>
+          </a:lnRef>
+          <a:fillRef idx="1">
+            <a:schemeClr val="accent3"/>
+          </a:fillRef>
+          <a:effectRef idx="0">
+            <a:schemeClr val="accent3"/>
+          </a:effectRef>
+          <a:fontRef idx="minor">
+            <a:schemeClr val="lt1"/>
+          </a:fontRef>
+        </p:style>
+        <p:txBody>
+          <a:bodyPr rtlCol="0" anchor="ctr"/>
+          <a:lstStyle/>
+          <a:p>
+            <a:pPr algn="ctr"/>
+            <a:endParaRPr lang="zh-TW" altLang="en-US"/>
+          </a:p>
+        </p:txBody>
+      </p:sp>
+      <p:sp>
+        <p:nvSpPr>
+          <p:cNvPr id="5" name="矩形 4"/>
+          <p:cNvSpPr/>
+          <p:nvPr/>
+        </p:nvSpPr>
+        <p:spPr>
+          <a:xfrm>
+            <a:off x="2598149" y="3126027"/>
+            <a:ext cx="648072" cy="360040"/>
+          </a:xfrm>
+          <a:prstGeom prst="rect">
+            <a:avLst/>
+          </a:prstGeom>
+        </p:spPr>
+        <p:style>
+          <a:lnRef idx="2">
+            <a:schemeClr val="accent3">
+              <a:shade val="50000"/>
+            </a:schemeClr>
+          </a:lnRef>
+          <a:fillRef idx="1">
+            <a:schemeClr val="accent3"/>
+          </a:fillRef>
+          <a:effectRef idx="0">
+            <a:schemeClr val="accent3"/>
+          </a:effectRef>
+          <a:fontRef idx="minor">
+            <a:schemeClr val="lt1"/>
+          </a:fontRef>
+        </p:style>
+        <p:txBody>
+          <a:bodyPr rtlCol="0" anchor="ctr"/>
+          <a:lstStyle/>
+          <a:p>
+            <a:pPr algn="ctr"/>
+            <a:endParaRPr lang="zh-TW" altLang="en-US"/>
+          </a:p>
+        </p:txBody>
+      </p:sp>
+      <p:sp>
+        <p:nvSpPr>
+          <p:cNvPr id="6" name="矩形 5"/>
+          <p:cNvSpPr/>
+          <p:nvPr/>
+        </p:nvSpPr>
+        <p:spPr>
+          <a:xfrm>
+            <a:off x="2598149" y="3630083"/>
+            <a:ext cx="648072" cy="360040"/>
+          </a:xfrm>
+          <a:prstGeom prst="rect">
+            <a:avLst/>
+          </a:prstGeom>
+        </p:spPr>
+        <p:style>
+          <a:lnRef idx="2">
+            <a:schemeClr val="accent3">
+              <a:shade val="50000"/>
+            </a:schemeClr>
+          </a:lnRef>
+          <a:fillRef idx="1">
+            <a:schemeClr val="accent3"/>
+          </a:fillRef>
+          <a:effectRef idx="0">
+            <a:schemeClr val="accent3"/>
+          </a:effectRef>
+          <a:fontRef idx="minor">
+            <a:schemeClr val="lt1"/>
+          </a:fontRef>
+        </p:style>
+        <p:txBody>
+          <a:bodyPr rtlCol="0" anchor="ctr"/>
+          <a:lstStyle/>
+          <a:p>
+            <a:pPr algn="ctr"/>
+            <a:endParaRPr lang="zh-TW" altLang="en-US"/>
+          </a:p>
+        </p:txBody>
+      </p:sp>
+      <p:sp>
+        <p:nvSpPr>
+          <p:cNvPr id="7" name="矩形 6"/>
+          <p:cNvSpPr/>
+          <p:nvPr/>
+        </p:nvSpPr>
+        <p:spPr>
+          <a:xfrm>
+            <a:off x="2598149" y="4134139"/>
+            <a:ext cx="648072" cy="360040"/>
+          </a:xfrm>
+          <a:prstGeom prst="rect">
+            <a:avLst/>
+          </a:prstGeom>
+        </p:spPr>
+        <p:style>
+          <a:lnRef idx="2">
+            <a:schemeClr val="accent3">
+              <a:shade val="50000"/>
+            </a:schemeClr>
+          </a:lnRef>
+          <a:fillRef idx="1">
+            <a:schemeClr val="accent3"/>
+          </a:fillRef>
+          <a:effectRef idx="0">
+            <a:schemeClr val="accent3"/>
+          </a:effectRef>
+          <a:fontRef idx="minor">
+            <a:schemeClr val="lt1"/>
+          </a:fontRef>
+        </p:style>
+        <p:txBody>
+          <a:bodyPr rtlCol="0" anchor="ctr"/>
+          <a:lstStyle/>
+          <a:p>
+            <a:pPr algn="ctr"/>
+            <a:endParaRPr lang="zh-TW" altLang="en-US"/>
+          </a:p>
+        </p:txBody>
+      </p:sp>
+      <p:sp>
+        <p:nvSpPr>
+          <p:cNvPr id="8" name="矩形 7"/>
+          <p:cNvSpPr/>
+          <p:nvPr/>
+        </p:nvSpPr>
+        <p:spPr>
+          <a:xfrm>
+            <a:off x="3371393" y="2621971"/>
+            <a:ext cx="648072" cy="360040"/>
+          </a:xfrm>
+          <a:prstGeom prst="rect">
+            <a:avLst/>
+          </a:prstGeom>
+        </p:spPr>
+        <p:style>
+          <a:lnRef idx="2">
+            <a:schemeClr val="accent3">
+              <a:shade val="50000"/>
+            </a:schemeClr>
+          </a:lnRef>
+          <a:fillRef idx="1">
+            <a:schemeClr val="accent3"/>
+          </a:fillRef>
+          <a:effectRef idx="0">
+            <a:schemeClr val="accent3"/>
+          </a:effectRef>
+          <a:fontRef idx="minor">
+            <a:schemeClr val="lt1"/>
+          </a:fontRef>
+        </p:style>
+        <p:txBody>
+          <a:bodyPr rtlCol="0" anchor="ctr"/>
+          <a:lstStyle/>
+          <a:p>
+            <a:pPr algn="ctr"/>
+            <a:endParaRPr lang="zh-TW" altLang="en-US"/>
+          </a:p>
+        </p:txBody>
+      </p:sp>
+      <p:sp>
+        <p:nvSpPr>
+          <p:cNvPr id="9" name="矩形 8"/>
+          <p:cNvSpPr/>
+          <p:nvPr/>
+        </p:nvSpPr>
+        <p:spPr>
+          <a:xfrm>
+            <a:off x="3371393" y="3126027"/>
+            <a:ext cx="648072" cy="360040"/>
+          </a:xfrm>
+          <a:prstGeom prst="rect">
+            <a:avLst/>
+          </a:prstGeom>
+        </p:spPr>
+        <p:style>
+          <a:lnRef idx="2">
+            <a:schemeClr val="accent3">
+              <a:shade val="50000"/>
+            </a:schemeClr>
+          </a:lnRef>
+          <a:fillRef idx="1">
+            <a:schemeClr val="accent3"/>
+          </a:fillRef>
+          <a:effectRef idx="0">
+            <a:schemeClr val="accent3"/>
+          </a:effectRef>
+          <a:fontRef idx="minor">
+            <a:schemeClr val="lt1"/>
+          </a:fontRef>
+        </p:style>
+        <p:txBody>
+          <a:bodyPr rtlCol="0" anchor="ctr"/>
+          <a:lstStyle/>
+          <a:p>
+            <a:pPr algn="ctr"/>
+            <a:endParaRPr lang="zh-TW" altLang="en-US"/>
+          </a:p>
+        </p:txBody>
+      </p:sp>
+      <p:sp>
+        <p:nvSpPr>
+          <p:cNvPr id="10" name="矩形 9"/>
+          <p:cNvSpPr/>
+          <p:nvPr/>
+        </p:nvSpPr>
+        <p:spPr>
+          <a:xfrm>
+            <a:off x="3371393" y="3630083"/>
+            <a:ext cx="648072" cy="360040"/>
+          </a:xfrm>
+          <a:prstGeom prst="rect">
+            <a:avLst/>
+          </a:prstGeom>
+        </p:spPr>
+        <p:style>
+          <a:lnRef idx="2">
+            <a:schemeClr val="accent3">
+              <a:shade val="50000"/>
+            </a:schemeClr>
+          </a:lnRef>
+          <a:fillRef idx="1">
+            <a:schemeClr val="accent3"/>
+          </a:fillRef>
+          <a:effectRef idx="0">
+            <a:schemeClr val="accent3"/>
+          </a:effectRef>
+          <a:fontRef idx="minor">
+            <a:schemeClr val="lt1"/>
+          </a:fontRef>
+        </p:style>
+        <p:txBody>
+          <a:bodyPr rtlCol="0" anchor="ctr"/>
+          <a:lstStyle/>
+          <a:p>
+            <a:pPr algn="ctr"/>
+            <a:endParaRPr lang="zh-TW" altLang="en-US"/>
+          </a:p>
+        </p:txBody>
+      </p:sp>
+      <p:sp>
+        <p:nvSpPr>
+          <p:cNvPr id="11" name="矩形 10"/>
+          <p:cNvSpPr/>
+          <p:nvPr/>
+        </p:nvSpPr>
+        <p:spPr>
+          <a:xfrm>
+            <a:off x="3371393" y="4134139"/>
+            <a:ext cx="648072" cy="360040"/>
+          </a:xfrm>
+          <a:prstGeom prst="rect">
+            <a:avLst/>
+          </a:prstGeom>
+        </p:spPr>
+        <p:style>
+          <a:lnRef idx="2">
+            <a:schemeClr val="accent3">
+              <a:shade val="50000"/>
+            </a:schemeClr>
+          </a:lnRef>
+          <a:fillRef idx="1">
+            <a:schemeClr val="accent3"/>
+          </a:fillRef>
+          <a:effectRef idx="0">
+            <a:schemeClr val="accent3"/>
+          </a:effectRef>
+          <a:fontRef idx="minor">
+            <a:schemeClr val="lt1"/>
+          </a:fontRef>
+        </p:style>
+        <p:txBody>
+          <a:bodyPr rtlCol="0" anchor="ctr"/>
+          <a:lstStyle/>
+          <a:p>
+            <a:pPr algn="ctr"/>
+            <a:endParaRPr lang="zh-TW" altLang="en-US"/>
+          </a:p>
+        </p:txBody>
+      </p:sp>
+      <p:sp>
+        <p:nvSpPr>
+          <p:cNvPr id="12" name="矩形 11"/>
+          <p:cNvSpPr/>
+          <p:nvPr/>
+        </p:nvSpPr>
+        <p:spPr>
+          <a:xfrm>
+            <a:off x="4128120" y="2621971"/>
+            <a:ext cx="648072" cy="360040"/>
+          </a:xfrm>
+          <a:prstGeom prst="rect">
+            <a:avLst/>
+          </a:prstGeom>
+        </p:spPr>
+        <p:style>
+          <a:lnRef idx="2">
+            <a:schemeClr val="accent3">
+              <a:shade val="50000"/>
+            </a:schemeClr>
+          </a:lnRef>
+          <a:fillRef idx="1">
+            <a:schemeClr val="accent3"/>
+          </a:fillRef>
+          <a:effectRef idx="0">
+            <a:schemeClr val="accent3"/>
+          </a:effectRef>
+          <a:fontRef idx="minor">
+            <a:schemeClr val="lt1"/>
+          </a:fontRef>
+        </p:style>
+        <p:txBody>
+          <a:bodyPr rtlCol="0" anchor="ctr"/>
+          <a:lstStyle/>
+          <a:p>
+            <a:pPr algn="ctr"/>
+            <a:endParaRPr lang="zh-TW" altLang="en-US"/>
+          </a:p>
+        </p:txBody>
+      </p:sp>
+      <p:sp>
+        <p:nvSpPr>
+          <p:cNvPr id="13" name="矩形 12"/>
+          <p:cNvSpPr/>
+          <p:nvPr/>
+        </p:nvSpPr>
+        <p:spPr>
+          <a:xfrm>
+            <a:off x="4128120" y="3126027"/>
+            <a:ext cx="648072" cy="360040"/>
+          </a:xfrm>
+          <a:prstGeom prst="rect">
+            <a:avLst/>
+          </a:prstGeom>
+        </p:spPr>
+        <p:style>
+          <a:lnRef idx="2">
+            <a:schemeClr val="accent3">
+              <a:shade val="50000"/>
+            </a:schemeClr>
+          </a:lnRef>
+          <a:fillRef idx="1">
+            <a:schemeClr val="accent3"/>
+          </a:fillRef>
+          <a:effectRef idx="0">
+            <a:schemeClr val="accent3"/>
+          </a:effectRef>
+          <a:fontRef idx="minor">
+            <a:schemeClr val="lt1"/>
+          </a:fontRef>
+        </p:style>
+        <p:txBody>
+          <a:bodyPr rtlCol="0" anchor="ctr"/>
+          <a:lstStyle/>
+          <a:p>
+            <a:pPr algn="ctr"/>
+            <a:endParaRPr lang="zh-TW" altLang="en-US"/>
+          </a:p>
+        </p:txBody>
+      </p:sp>
+      <p:sp>
+        <p:nvSpPr>
+          <p:cNvPr id="14" name="矩形 13"/>
+          <p:cNvSpPr/>
+          <p:nvPr/>
+        </p:nvSpPr>
+        <p:spPr>
+          <a:xfrm>
+            <a:off x="4139952" y="3630083"/>
+            <a:ext cx="648072" cy="360040"/>
+          </a:xfrm>
+          <a:prstGeom prst="rect">
+            <a:avLst/>
+          </a:prstGeom>
+          <a:ln/>
+        </p:spPr>
+        <p:style>
+          <a:lnRef idx="2">
+            <a:schemeClr val="accent3">
+              <a:shade val="50000"/>
+            </a:schemeClr>
+          </a:lnRef>
+          <a:fillRef idx="1">
+            <a:schemeClr val="accent3"/>
+          </a:fillRef>
+          <a:effectRef idx="0">
+            <a:schemeClr val="accent3"/>
+          </a:effectRef>
+          <a:fontRef idx="minor">
+            <a:schemeClr val="lt1"/>
+          </a:fontRef>
+        </p:style>
+        <p:txBody>
+          <a:bodyPr rtlCol="0" anchor="ctr"/>
+          <a:lstStyle/>
+          <a:p>
+            <a:pPr algn="ctr"/>
+            <a:endParaRPr lang="zh-TW" altLang="en-US"/>
+          </a:p>
+        </p:txBody>
+      </p:sp>
+      <p:sp>
+        <p:nvSpPr>
+          <p:cNvPr id="15" name="矩形 14"/>
+          <p:cNvSpPr/>
+          <p:nvPr/>
+        </p:nvSpPr>
+        <p:spPr>
+          <a:xfrm>
+            <a:off x="4148275" y="4134139"/>
+            <a:ext cx="648072" cy="360040"/>
+          </a:xfrm>
+          <a:prstGeom prst="rect">
+            <a:avLst/>
+          </a:prstGeom>
+        </p:spPr>
+        <p:style>
+          <a:lnRef idx="2">
+            <a:schemeClr val="accent3">
+              <a:shade val="50000"/>
+            </a:schemeClr>
+          </a:lnRef>
+          <a:fillRef idx="1">
+            <a:schemeClr val="accent3"/>
+          </a:fillRef>
+          <a:effectRef idx="0">
+            <a:schemeClr val="accent3"/>
+          </a:effectRef>
+          <a:fontRef idx="minor">
+            <a:schemeClr val="lt1"/>
+          </a:fontRef>
+        </p:style>
+        <p:txBody>
+          <a:bodyPr rtlCol="0" anchor="ctr"/>
+          <a:lstStyle/>
+          <a:p>
+            <a:pPr algn="ctr"/>
+            <a:endParaRPr lang="zh-TW" altLang="en-US"/>
+          </a:p>
+        </p:txBody>
+      </p:sp>
+      <p:sp>
+        <p:nvSpPr>
+          <p:cNvPr id="16" name="矩形 15"/>
+          <p:cNvSpPr/>
+          <p:nvPr/>
+        </p:nvSpPr>
+        <p:spPr>
+          <a:xfrm>
+            <a:off x="4890120" y="2622201"/>
+            <a:ext cx="648072" cy="360040"/>
+          </a:xfrm>
+          <a:prstGeom prst="rect">
+            <a:avLst/>
+          </a:prstGeom>
+        </p:spPr>
+        <p:style>
+          <a:lnRef idx="2">
+            <a:schemeClr val="accent3">
+              <a:shade val="50000"/>
+            </a:schemeClr>
+          </a:lnRef>
+          <a:fillRef idx="1">
+            <a:schemeClr val="accent3"/>
+          </a:fillRef>
+          <a:effectRef idx="0">
+            <a:schemeClr val="accent3"/>
+          </a:effectRef>
+          <a:fontRef idx="minor">
+            <a:schemeClr val="lt1"/>
+          </a:fontRef>
+        </p:style>
+        <p:txBody>
+          <a:bodyPr rtlCol="0" anchor="ctr"/>
+          <a:lstStyle/>
+          <a:p>
+            <a:pPr algn="ctr"/>
+            <a:endParaRPr lang="zh-TW" altLang="en-US"/>
+          </a:p>
+        </p:txBody>
+      </p:sp>
+      <p:sp>
+        <p:nvSpPr>
+          <p:cNvPr id="17" name="矩形 16"/>
+          <p:cNvSpPr/>
+          <p:nvPr/>
+        </p:nvSpPr>
+        <p:spPr>
+          <a:xfrm>
+            <a:off x="4890120" y="3126027"/>
+            <a:ext cx="648072" cy="360040"/>
+          </a:xfrm>
+          <a:prstGeom prst="rect">
+            <a:avLst/>
+          </a:prstGeom>
+        </p:spPr>
+        <p:style>
+          <a:lnRef idx="2">
+            <a:schemeClr val="accent3">
+              <a:shade val="50000"/>
+            </a:schemeClr>
+          </a:lnRef>
+          <a:fillRef idx="1">
+            <a:schemeClr val="accent3"/>
+          </a:fillRef>
+          <a:effectRef idx="0">
+            <a:schemeClr val="accent3"/>
+          </a:effectRef>
+          <a:fontRef idx="minor">
+            <a:schemeClr val="lt1"/>
+          </a:fontRef>
+        </p:style>
+        <p:txBody>
+          <a:bodyPr rtlCol="0" anchor="ctr"/>
+          <a:lstStyle/>
+          <a:p>
+            <a:pPr algn="ctr"/>
+            <a:endParaRPr lang="zh-TW" altLang="en-US"/>
+          </a:p>
+        </p:txBody>
+      </p:sp>
+      <p:sp>
+        <p:nvSpPr>
+          <p:cNvPr id="18" name="矩形 17"/>
+          <p:cNvSpPr/>
+          <p:nvPr/>
+        </p:nvSpPr>
+        <p:spPr>
+          <a:xfrm>
+            <a:off x="4890120" y="3630083"/>
+            <a:ext cx="648072" cy="360040"/>
+          </a:xfrm>
+          <a:prstGeom prst="rect">
+            <a:avLst/>
+          </a:prstGeom>
+        </p:spPr>
+        <p:style>
+          <a:lnRef idx="2">
+            <a:schemeClr val="accent3">
+              <a:shade val="50000"/>
+            </a:schemeClr>
+          </a:lnRef>
+          <a:fillRef idx="1">
+            <a:schemeClr val="accent3"/>
+          </a:fillRef>
+          <a:effectRef idx="0">
+            <a:schemeClr val="accent3"/>
+          </a:effectRef>
+          <a:fontRef idx="minor">
+            <a:schemeClr val="lt1"/>
+          </a:fontRef>
+        </p:style>
+        <p:txBody>
+          <a:bodyPr rtlCol="0" anchor="ctr"/>
+          <a:lstStyle/>
+          <a:p>
+            <a:pPr algn="ctr"/>
+            <a:endParaRPr lang="zh-TW" altLang="en-US"/>
+          </a:p>
+        </p:txBody>
+      </p:sp>
+      <p:sp>
+        <p:nvSpPr>
+          <p:cNvPr id="19" name="矩形 18"/>
+          <p:cNvSpPr/>
+          <p:nvPr/>
+        </p:nvSpPr>
+        <p:spPr>
+          <a:xfrm>
+            <a:off x="4890120" y="4134139"/>
+            <a:ext cx="648072" cy="360040"/>
+          </a:xfrm>
+          <a:prstGeom prst="rect">
+            <a:avLst/>
+          </a:prstGeom>
+        </p:spPr>
+        <p:style>
+          <a:lnRef idx="2">
+            <a:schemeClr val="accent3">
+              <a:shade val="50000"/>
+            </a:schemeClr>
+          </a:lnRef>
+          <a:fillRef idx="1">
+            <a:schemeClr val="accent3"/>
+          </a:fillRef>
+          <a:effectRef idx="0">
+            <a:schemeClr val="accent3"/>
+          </a:effectRef>
+          <a:fontRef idx="minor">
+            <a:schemeClr val="lt1"/>
+          </a:fontRef>
+        </p:style>
+        <p:txBody>
+          <a:bodyPr rtlCol="0" anchor="ctr"/>
+          <a:lstStyle/>
+          <a:p>
+            <a:pPr algn="ctr"/>
+            <a:endParaRPr lang="zh-TW" altLang="en-US"/>
+          </a:p>
+        </p:txBody>
+      </p:sp>
+      <p:sp>
+        <p:nvSpPr>
+          <p:cNvPr id="20" name="矩形 19"/>
+          <p:cNvSpPr/>
+          <p:nvPr/>
+        </p:nvSpPr>
+        <p:spPr>
+          <a:xfrm>
+            <a:off x="5643614" y="2621971"/>
+            <a:ext cx="648072" cy="360040"/>
+          </a:xfrm>
+          <a:prstGeom prst="rect">
+            <a:avLst/>
+          </a:prstGeom>
+        </p:spPr>
+        <p:style>
+          <a:lnRef idx="2">
+            <a:schemeClr val="accent3">
+              <a:shade val="50000"/>
+            </a:schemeClr>
+          </a:lnRef>
+          <a:fillRef idx="1">
+            <a:schemeClr val="accent3"/>
+          </a:fillRef>
+          <a:effectRef idx="0">
+            <a:schemeClr val="accent3"/>
+          </a:effectRef>
+          <a:fontRef idx="minor">
+            <a:schemeClr val="lt1"/>
+          </a:fontRef>
+        </p:style>
+        <p:txBody>
+          <a:bodyPr rtlCol="0" anchor="ctr"/>
+          <a:lstStyle/>
+          <a:p>
+            <a:pPr algn="ctr"/>
+            <a:endParaRPr lang="zh-TW" altLang="en-US"/>
+          </a:p>
+        </p:txBody>
+      </p:sp>
+      <p:sp>
+        <p:nvSpPr>
+          <p:cNvPr id="21" name="矩形 20"/>
+          <p:cNvSpPr/>
+          <p:nvPr/>
+        </p:nvSpPr>
+        <p:spPr>
+          <a:xfrm>
+            <a:off x="5643614" y="3126027"/>
+            <a:ext cx="648072" cy="360040"/>
+          </a:xfrm>
+          <a:prstGeom prst="rect">
+            <a:avLst/>
+          </a:prstGeom>
+        </p:spPr>
+        <p:style>
+          <a:lnRef idx="2">
+            <a:schemeClr val="accent3">
+              <a:shade val="50000"/>
+            </a:schemeClr>
+          </a:lnRef>
+          <a:fillRef idx="1">
+            <a:schemeClr val="accent3"/>
+          </a:fillRef>
+          <a:effectRef idx="0">
+            <a:schemeClr val="accent3"/>
+          </a:effectRef>
+          <a:fontRef idx="minor">
+            <a:schemeClr val="lt1"/>
+          </a:fontRef>
+        </p:style>
+        <p:txBody>
+          <a:bodyPr rtlCol="0" anchor="ctr"/>
+          <a:lstStyle/>
+          <a:p>
+            <a:pPr algn="ctr"/>
+            <a:endParaRPr lang="zh-TW" altLang="en-US"/>
+          </a:p>
+        </p:txBody>
+      </p:sp>
+      <p:sp>
+        <p:nvSpPr>
+          <p:cNvPr id="22" name="矩形 21"/>
+          <p:cNvSpPr/>
+          <p:nvPr/>
+        </p:nvSpPr>
+        <p:spPr>
+          <a:xfrm>
+            <a:off x="5652120" y="3630083"/>
+            <a:ext cx="648072" cy="360040"/>
+          </a:xfrm>
+          <a:prstGeom prst="rect">
+            <a:avLst/>
+          </a:prstGeom>
+        </p:spPr>
+        <p:style>
+          <a:lnRef idx="2">
+            <a:schemeClr val="accent3">
+              <a:shade val="50000"/>
+            </a:schemeClr>
+          </a:lnRef>
+          <a:fillRef idx="1">
+            <a:schemeClr val="accent3"/>
+          </a:fillRef>
+          <a:effectRef idx="0">
+            <a:schemeClr val="accent3"/>
+          </a:effectRef>
+          <a:fontRef idx="minor">
+            <a:schemeClr val="lt1"/>
+          </a:fontRef>
+        </p:style>
+        <p:txBody>
+          <a:bodyPr rtlCol="0" anchor="ctr"/>
+          <a:lstStyle/>
+          <a:p>
+            <a:pPr algn="ctr"/>
+            <a:endParaRPr lang="zh-TW" altLang="en-US"/>
+          </a:p>
+        </p:txBody>
+      </p:sp>
+      <p:sp>
+        <p:nvSpPr>
+          <p:cNvPr id="23" name="矩形 22"/>
+          <p:cNvSpPr/>
+          <p:nvPr/>
+        </p:nvSpPr>
+        <p:spPr>
+          <a:xfrm>
+            <a:off x="5643614" y="4134139"/>
+            <a:ext cx="648072" cy="360040"/>
+          </a:xfrm>
+          <a:prstGeom prst="rect">
+            <a:avLst/>
+          </a:prstGeom>
+        </p:spPr>
+        <p:style>
+          <a:lnRef idx="2">
+            <a:schemeClr val="accent3">
+              <a:shade val="50000"/>
+            </a:schemeClr>
+          </a:lnRef>
+          <a:fillRef idx="1">
+            <a:schemeClr val="accent3"/>
+          </a:fillRef>
+          <a:effectRef idx="0">
+            <a:schemeClr val="accent3"/>
+          </a:effectRef>
+          <a:fontRef idx="minor">
+            <a:schemeClr val="lt1"/>
+          </a:fontRef>
+        </p:style>
+        <p:txBody>
+          <a:bodyPr rtlCol="0" anchor="ctr"/>
+          <a:lstStyle/>
+          <a:p>
+            <a:pPr algn="ctr"/>
+            <a:endParaRPr lang="zh-TW" altLang="en-US"/>
+          </a:p>
+        </p:txBody>
+      </p:sp>
+      <p:sp>
+        <p:nvSpPr>
+          <p:cNvPr id="24" name="文字方塊 23"/>
+          <p:cNvSpPr txBox="1"/>
+          <p:nvPr/>
+        </p:nvSpPr>
+        <p:spPr>
+          <a:xfrm>
+            <a:off x="971600" y="3270043"/>
+            <a:ext cx="1590949" cy="461665"/>
+          </a:xfrm>
+          <a:prstGeom prst="rect">
+            <a:avLst/>
+          </a:prstGeom>
+          <a:noFill/>
+        </p:spPr>
+        <p:txBody>
+          <a:bodyPr wrap="square" rtlCol="0">
+            <a:spAutoFit/>
+          </a:bodyPr>
+          <a:lstStyle/>
+          <a:p>
+            <a:pPr algn="ctr"/>
+            <a:r>
+              <a:rPr lang="en-US" altLang="zh-TW" sz="2400" dirty="0" err="1" smtClean="0"/>
+              <a:t>row.names</a:t>
+            </a:r>
+            <a:endParaRPr lang="zh-TW" altLang="en-US" sz="2400" dirty="0"/>
+          </a:p>
+        </p:txBody>
+      </p:sp>
+      <p:sp>
+        <p:nvSpPr>
+          <p:cNvPr id="25" name="文字方塊 24"/>
+          <p:cNvSpPr txBox="1"/>
+          <p:nvPr/>
+        </p:nvSpPr>
+        <p:spPr>
+          <a:xfrm>
+            <a:off x="3723676" y="2167349"/>
+            <a:ext cx="1456959" cy="461665"/>
+          </a:xfrm>
+          <a:prstGeom prst="rect">
+            <a:avLst/>
+          </a:prstGeom>
+          <a:noFill/>
+        </p:spPr>
+        <p:txBody>
+          <a:bodyPr wrap="square" rtlCol="0">
+            <a:spAutoFit/>
+          </a:bodyPr>
+          <a:lstStyle/>
+          <a:p>
+            <a:pPr algn="ctr"/>
+            <a:r>
+              <a:rPr lang="en-US" altLang="zh-TW" sz="2400" dirty="0" smtClean="0"/>
+              <a:t>$names</a:t>
+            </a:r>
+            <a:endParaRPr lang="zh-TW" altLang="en-US" sz="2400" dirty="0"/>
+          </a:p>
+        </p:txBody>
+      </p:sp>
+    </p:spTree>
+    <p:extLst>
+      <p:ext uri="{BB962C8B-B14F-4D97-AF65-F5344CB8AC3E}">
+        <p14:creationId xmlns:p14="http://schemas.microsoft.com/office/powerpoint/2010/main" val="3432887086"/>
+      </p:ext>
+    </p:extLst>
+  </p:cSld>
+  <p:clrMapOvr>
+    <a:masterClrMapping/>
+  </p:clrMapOvr>
+</p:sld>
+</file>
+
+<file path=ppt/slides/slide5.xml><?xml version="1.0" encoding="utf-8"?>
+<p:sld xmlns:a="http://schemas.openxmlformats.org/drawingml/2006/main" xmlns:r="http://schemas.openxmlformats.org/officeDocument/2006/relationships" xmlns:p="http://schemas.openxmlformats.org/presentationml/2006/main">
+  <p:cSld>
+    <p:spTree>
+      <p:nvGrpSpPr>
+        <p:cNvPr id="1" name=""/>
+        <p:cNvGrpSpPr/>
+        <p:nvPr/>
+      </p:nvGrpSpPr>
+      <p:grpSpPr>
+        <a:xfrm>
+          <a:off x="0" y="0"/>
+          <a:ext cx="0" cy="0"/>
+          <a:chOff x="0" y="0"/>
+          <a:chExt cx="0" cy="0"/>
+        </a:xfrm>
+      </p:grpSpPr>
+      <p:sp>
+        <p:nvSpPr>
+          <p:cNvPr id="4" name="矩形 3"/>
+          <p:cNvSpPr/>
+          <p:nvPr/>
+        </p:nvSpPr>
+        <p:spPr>
+          <a:xfrm>
+            <a:off x="2598553" y="2636912"/>
+            <a:ext cx="648072" cy="360040"/>
+          </a:xfrm>
+          <a:prstGeom prst="rect">
+            <a:avLst/>
+          </a:prstGeom>
+        </p:spPr>
+        <p:style>
+          <a:lnRef idx="2">
+            <a:schemeClr val="accent3">
+              <a:shade val="50000"/>
+            </a:schemeClr>
+          </a:lnRef>
+          <a:fillRef idx="1">
+            <a:schemeClr val="accent3"/>
+          </a:fillRef>
+          <a:effectRef idx="0">
+            <a:schemeClr val="accent3"/>
+          </a:effectRef>
+          <a:fontRef idx="minor">
+            <a:schemeClr val="lt1"/>
+          </a:fontRef>
+        </p:style>
+        <p:txBody>
+          <a:bodyPr rtlCol="0" anchor="ctr"/>
+          <a:lstStyle/>
+          <a:p>
+            <a:pPr algn="ctr"/>
+            <a:endParaRPr lang="zh-TW" altLang="en-US"/>
+          </a:p>
+        </p:txBody>
+      </p:sp>
+      <p:sp>
+        <p:nvSpPr>
+          <p:cNvPr id="5" name="矩形 4"/>
+          <p:cNvSpPr/>
+          <p:nvPr/>
+        </p:nvSpPr>
+        <p:spPr>
+          <a:xfrm>
+            <a:off x="2598149" y="3140968"/>
+            <a:ext cx="648072" cy="360040"/>
+          </a:xfrm>
+          <a:prstGeom prst="rect">
+            <a:avLst/>
+          </a:prstGeom>
+        </p:spPr>
+        <p:style>
+          <a:lnRef idx="2">
+            <a:schemeClr val="accent3">
+              <a:shade val="50000"/>
+            </a:schemeClr>
+          </a:lnRef>
+          <a:fillRef idx="1">
+            <a:schemeClr val="accent3"/>
+          </a:fillRef>
+          <a:effectRef idx="0">
+            <a:schemeClr val="accent3"/>
+          </a:effectRef>
+          <a:fontRef idx="minor">
+            <a:schemeClr val="lt1"/>
+          </a:fontRef>
+        </p:style>
+        <p:txBody>
+          <a:bodyPr rtlCol="0" anchor="ctr"/>
+          <a:lstStyle/>
+          <a:p>
+            <a:pPr algn="ctr"/>
+            <a:endParaRPr lang="zh-TW" altLang="en-US"/>
+          </a:p>
+        </p:txBody>
+      </p:sp>
+      <p:sp>
+        <p:nvSpPr>
+          <p:cNvPr id="6" name="矩形 5"/>
+          <p:cNvSpPr/>
+          <p:nvPr/>
+        </p:nvSpPr>
+        <p:spPr>
+          <a:xfrm>
+            <a:off x="2598149" y="3645024"/>
+            <a:ext cx="648072" cy="360040"/>
+          </a:xfrm>
+          <a:prstGeom prst="rect">
+            <a:avLst/>
+          </a:prstGeom>
+        </p:spPr>
+        <p:style>
+          <a:lnRef idx="2">
+            <a:schemeClr val="accent3">
+              <a:shade val="50000"/>
+            </a:schemeClr>
+          </a:lnRef>
+          <a:fillRef idx="1">
+            <a:schemeClr val="accent3"/>
+          </a:fillRef>
+          <a:effectRef idx="0">
+            <a:schemeClr val="accent3"/>
+          </a:effectRef>
+          <a:fontRef idx="minor">
+            <a:schemeClr val="lt1"/>
+          </a:fontRef>
+        </p:style>
+        <p:txBody>
+          <a:bodyPr rtlCol="0" anchor="ctr"/>
+          <a:lstStyle/>
+          <a:p>
+            <a:pPr algn="ctr"/>
+            <a:endParaRPr lang="zh-TW" altLang="en-US"/>
+          </a:p>
+        </p:txBody>
+      </p:sp>
+      <p:sp>
+        <p:nvSpPr>
+          <p:cNvPr id="7" name="矩形 6"/>
+          <p:cNvSpPr/>
+          <p:nvPr/>
+        </p:nvSpPr>
+        <p:spPr>
+          <a:xfrm>
+            <a:off x="2598149" y="4149080"/>
+            <a:ext cx="648072" cy="360040"/>
+          </a:xfrm>
+          <a:prstGeom prst="rect">
+            <a:avLst/>
+          </a:prstGeom>
+        </p:spPr>
+        <p:style>
+          <a:lnRef idx="2">
+            <a:schemeClr val="accent3">
+              <a:shade val="50000"/>
+            </a:schemeClr>
+          </a:lnRef>
+          <a:fillRef idx="1">
+            <a:schemeClr val="accent3"/>
+          </a:fillRef>
+          <a:effectRef idx="0">
+            <a:schemeClr val="accent3"/>
+          </a:effectRef>
+          <a:fontRef idx="minor">
+            <a:schemeClr val="lt1"/>
+          </a:fontRef>
+        </p:style>
+        <p:txBody>
+          <a:bodyPr rtlCol="0" anchor="ctr"/>
+          <a:lstStyle/>
+          <a:p>
+            <a:pPr algn="ctr"/>
+            <a:endParaRPr lang="zh-TW" altLang="en-US"/>
+          </a:p>
+        </p:txBody>
+      </p:sp>
+      <p:sp>
+        <p:nvSpPr>
+          <p:cNvPr id="8" name="矩形 7"/>
+          <p:cNvSpPr/>
+          <p:nvPr/>
+        </p:nvSpPr>
+        <p:spPr>
+          <a:xfrm>
+            <a:off x="3371393" y="2636912"/>
+            <a:ext cx="648072" cy="360040"/>
+          </a:xfrm>
+          <a:prstGeom prst="rect">
+            <a:avLst/>
+          </a:prstGeom>
+        </p:spPr>
+        <p:style>
+          <a:lnRef idx="2">
+            <a:schemeClr val="accent3">
+              <a:shade val="50000"/>
+            </a:schemeClr>
+          </a:lnRef>
+          <a:fillRef idx="1">
+            <a:schemeClr val="accent3"/>
+          </a:fillRef>
+          <a:effectRef idx="0">
+            <a:schemeClr val="accent3"/>
+          </a:effectRef>
+          <a:fontRef idx="minor">
+            <a:schemeClr val="lt1"/>
+          </a:fontRef>
+        </p:style>
+        <p:txBody>
+          <a:bodyPr rtlCol="0" anchor="ctr"/>
+          <a:lstStyle/>
+          <a:p>
+            <a:pPr algn="ctr"/>
+            <a:endParaRPr lang="zh-TW" altLang="en-US"/>
+          </a:p>
+        </p:txBody>
+      </p:sp>
+      <p:sp>
+        <p:nvSpPr>
+          <p:cNvPr id="9" name="矩形 8"/>
+          <p:cNvSpPr/>
+          <p:nvPr/>
+        </p:nvSpPr>
+        <p:spPr>
+          <a:xfrm>
+            <a:off x="3371393" y="3140968"/>
+            <a:ext cx="648072" cy="360040"/>
+          </a:xfrm>
+          <a:prstGeom prst="rect">
+            <a:avLst/>
+          </a:prstGeom>
+        </p:spPr>
+        <p:style>
+          <a:lnRef idx="2">
+            <a:schemeClr val="accent3">
+              <a:shade val="50000"/>
+            </a:schemeClr>
+          </a:lnRef>
+          <a:fillRef idx="1">
+            <a:schemeClr val="accent3"/>
+          </a:fillRef>
+          <a:effectRef idx="0">
+            <a:schemeClr val="accent3"/>
+          </a:effectRef>
+          <a:fontRef idx="minor">
+            <a:schemeClr val="lt1"/>
+          </a:fontRef>
+        </p:style>
+        <p:txBody>
+          <a:bodyPr rtlCol="0" anchor="ctr"/>
+          <a:lstStyle/>
+          <a:p>
+            <a:pPr algn="ctr"/>
+            <a:endParaRPr lang="zh-TW" altLang="en-US"/>
+          </a:p>
+        </p:txBody>
+      </p:sp>
+      <p:sp>
+        <p:nvSpPr>
+          <p:cNvPr id="10" name="矩形 9"/>
+          <p:cNvSpPr/>
+          <p:nvPr/>
+        </p:nvSpPr>
+        <p:spPr>
+          <a:xfrm>
+            <a:off x="3371393" y="3645024"/>
+            <a:ext cx="648072" cy="360040"/>
+          </a:xfrm>
+          <a:prstGeom prst="rect">
+            <a:avLst/>
+          </a:prstGeom>
+        </p:spPr>
+        <p:style>
+          <a:lnRef idx="2">
+            <a:schemeClr val="accent3">
+              <a:shade val="50000"/>
+            </a:schemeClr>
+          </a:lnRef>
+          <a:fillRef idx="1">
+            <a:schemeClr val="accent3"/>
+          </a:fillRef>
+          <a:effectRef idx="0">
+            <a:schemeClr val="accent3"/>
+          </a:effectRef>
+          <a:fontRef idx="minor">
+            <a:schemeClr val="lt1"/>
+          </a:fontRef>
+        </p:style>
+        <p:txBody>
+          <a:bodyPr rtlCol="0" anchor="ctr"/>
+          <a:lstStyle/>
+          <a:p>
+            <a:pPr algn="ctr"/>
+            <a:endParaRPr lang="zh-TW" altLang="en-US"/>
+          </a:p>
+        </p:txBody>
+      </p:sp>
+      <p:sp>
+        <p:nvSpPr>
+          <p:cNvPr id="11" name="矩形 10"/>
+          <p:cNvSpPr/>
+          <p:nvPr/>
+        </p:nvSpPr>
+        <p:spPr>
+          <a:xfrm>
+            <a:off x="3371393" y="4149080"/>
+            <a:ext cx="648072" cy="360040"/>
+          </a:xfrm>
+          <a:prstGeom prst="rect">
+            <a:avLst/>
+          </a:prstGeom>
+        </p:spPr>
+        <p:style>
+          <a:lnRef idx="2">
+            <a:schemeClr val="accent3">
+              <a:shade val="50000"/>
+            </a:schemeClr>
+          </a:lnRef>
+          <a:fillRef idx="1">
+            <a:schemeClr val="accent3"/>
+          </a:fillRef>
+          <a:effectRef idx="0">
+            <a:schemeClr val="accent3"/>
+          </a:effectRef>
+          <a:fontRef idx="minor">
+            <a:schemeClr val="lt1"/>
+          </a:fontRef>
+        </p:style>
+        <p:txBody>
+          <a:bodyPr rtlCol="0" anchor="ctr"/>
+          <a:lstStyle/>
+          <a:p>
+            <a:pPr algn="ctr"/>
+            <a:endParaRPr lang="zh-TW" altLang="en-US"/>
+          </a:p>
+        </p:txBody>
+      </p:sp>
+      <p:sp>
+        <p:nvSpPr>
+          <p:cNvPr id="12" name="矩形 11"/>
+          <p:cNvSpPr/>
+          <p:nvPr/>
+        </p:nvSpPr>
+        <p:spPr>
+          <a:xfrm>
+            <a:off x="4128120" y="2636912"/>
+            <a:ext cx="648072" cy="360040"/>
+          </a:xfrm>
+          <a:prstGeom prst="rect">
+            <a:avLst/>
+          </a:prstGeom>
+        </p:spPr>
+        <p:style>
+          <a:lnRef idx="2">
+            <a:schemeClr val="accent3">
+              <a:shade val="50000"/>
+            </a:schemeClr>
+          </a:lnRef>
+          <a:fillRef idx="1">
+            <a:schemeClr val="accent3"/>
+          </a:fillRef>
+          <a:effectRef idx="0">
+            <a:schemeClr val="accent3"/>
+          </a:effectRef>
+          <a:fontRef idx="minor">
+            <a:schemeClr val="lt1"/>
+          </a:fontRef>
+        </p:style>
+        <p:txBody>
+          <a:bodyPr rtlCol="0" anchor="ctr"/>
+          <a:lstStyle/>
+          <a:p>
+            <a:pPr algn="ctr"/>
+            <a:endParaRPr lang="zh-TW" altLang="en-US"/>
+          </a:p>
+        </p:txBody>
+      </p:sp>
+      <p:sp>
+        <p:nvSpPr>
+          <p:cNvPr id="13" name="矩形 12"/>
+          <p:cNvSpPr/>
+          <p:nvPr/>
+        </p:nvSpPr>
+        <p:spPr>
+          <a:xfrm>
+            <a:off x="4128120" y="3140968"/>
+            <a:ext cx="648072" cy="360040"/>
+          </a:xfrm>
+          <a:prstGeom prst="rect">
+            <a:avLst/>
+          </a:prstGeom>
+        </p:spPr>
+        <p:style>
+          <a:lnRef idx="2">
+            <a:schemeClr val="accent3">
+              <a:shade val="50000"/>
+            </a:schemeClr>
+          </a:lnRef>
+          <a:fillRef idx="1">
+            <a:schemeClr val="accent3"/>
+          </a:fillRef>
+          <a:effectRef idx="0">
+            <a:schemeClr val="accent3"/>
+          </a:effectRef>
+          <a:fontRef idx="minor">
+            <a:schemeClr val="lt1"/>
+          </a:fontRef>
+        </p:style>
+        <p:txBody>
+          <a:bodyPr rtlCol="0" anchor="ctr"/>
+          <a:lstStyle/>
+          <a:p>
+            <a:pPr algn="ctr"/>
+            <a:endParaRPr lang="zh-TW" altLang="en-US"/>
+          </a:p>
+        </p:txBody>
+      </p:sp>
+      <p:sp>
+        <p:nvSpPr>
+          <p:cNvPr id="14" name="矩形 13"/>
+          <p:cNvSpPr/>
+          <p:nvPr/>
+        </p:nvSpPr>
+        <p:spPr>
+          <a:xfrm>
+            <a:off x="4139952" y="3645024"/>
+            <a:ext cx="648072" cy="360040"/>
+          </a:xfrm>
+          <a:prstGeom prst="rect">
+            <a:avLst/>
+          </a:prstGeom>
+          <a:ln/>
+        </p:spPr>
+        <p:style>
+          <a:lnRef idx="2">
+            <a:schemeClr val="accent3">
+              <a:shade val="50000"/>
+            </a:schemeClr>
+          </a:lnRef>
+          <a:fillRef idx="1">
+            <a:schemeClr val="accent3"/>
+          </a:fillRef>
+          <a:effectRef idx="0">
+            <a:schemeClr val="accent3"/>
+          </a:effectRef>
+          <a:fontRef idx="minor">
+            <a:schemeClr val="lt1"/>
+          </a:fontRef>
+        </p:style>
+        <p:txBody>
+          <a:bodyPr rtlCol="0" anchor="ctr"/>
+          <a:lstStyle/>
+          <a:p>
+            <a:pPr algn="ctr"/>
+            <a:endParaRPr lang="zh-TW" altLang="en-US"/>
+          </a:p>
+        </p:txBody>
+      </p:sp>
+      <p:sp>
+        <p:nvSpPr>
+          <p:cNvPr id="15" name="矩形 14"/>
+          <p:cNvSpPr/>
+          <p:nvPr/>
+        </p:nvSpPr>
+        <p:spPr>
+          <a:xfrm>
+            <a:off x="4148275" y="4149080"/>
+            <a:ext cx="648072" cy="360040"/>
+          </a:xfrm>
+          <a:prstGeom prst="rect">
+            <a:avLst/>
+          </a:prstGeom>
+        </p:spPr>
+        <p:style>
+          <a:lnRef idx="2">
+            <a:schemeClr val="accent3">
+              <a:shade val="50000"/>
+            </a:schemeClr>
+          </a:lnRef>
+          <a:fillRef idx="1">
+            <a:schemeClr val="accent3"/>
+          </a:fillRef>
+          <a:effectRef idx="0">
+            <a:schemeClr val="accent3"/>
+          </a:effectRef>
+          <a:fontRef idx="minor">
+            <a:schemeClr val="lt1"/>
+          </a:fontRef>
+        </p:style>
+        <p:txBody>
+          <a:bodyPr rtlCol="0" anchor="ctr"/>
+          <a:lstStyle/>
+          <a:p>
+            <a:pPr algn="ctr"/>
+            <a:endParaRPr lang="zh-TW" altLang="en-US"/>
+          </a:p>
+        </p:txBody>
+      </p:sp>
+      <p:sp>
+        <p:nvSpPr>
+          <p:cNvPr id="16" name="矩形 15"/>
+          <p:cNvSpPr/>
+          <p:nvPr/>
+        </p:nvSpPr>
+        <p:spPr>
+          <a:xfrm>
+            <a:off x="4890120" y="2637142"/>
+            <a:ext cx="648072" cy="360040"/>
+          </a:xfrm>
+          <a:prstGeom prst="rect">
+            <a:avLst/>
+          </a:prstGeom>
+        </p:spPr>
+        <p:style>
+          <a:lnRef idx="2">
+            <a:schemeClr val="accent3">
+              <a:shade val="50000"/>
+            </a:schemeClr>
+          </a:lnRef>
+          <a:fillRef idx="1">
+            <a:schemeClr val="accent3"/>
+          </a:fillRef>
+          <a:effectRef idx="0">
+            <a:schemeClr val="accent3"/>
+          </a:effectRef>
+          <a:fontRef idx="minor">
+            <a:schemeClr val="lt1"/>
+          </a:fontRef>
+        </p:style>
+        <p:txBody>
+          <a:bodyPr rtlCol="0" anchor="ctr"/>
+          <a:lstStyle/>
+          <a:p>
+            <a:pPr algn="ctr"/>
+            <a:endParaRPr lang="zh-TW" altLang="en-US"/>
+          </a:p>
+        </p:txBody>
+      </p:sp>
+      <p:sp>
+        <p:nvSpPr>
+          <p:cNvPr id="17" name="矩形 16"/>
+          <p:cNvSpPr/>
+          <p:nvPr/>
+        </p:nvSpPr>
+        <p:spPr>
+          <a:xfrm>
+            <a:off x="4890120" y="3140968"/>
+            <a:ext cx="648072" cy="360040"/>
+          </a:xfrm>
+          <a:prstGeom prst="rect">
+            <a:avLst/>
+          </a:prstGeom>
+        </p:spPr>
+        <p:style>
+          <a:lnRef idx="2">
+            <a:schemeClr val="accent3">
+              <a:shade val="50000"/>
+            </a:schemeClr>
+          </a:lnRef>
+          <a:fillRef idx="1">
+            <a:schemeClr val="accent3"/>
+          </a:fillRef>
+          <a:effectRef idx="0">
+            <a:schemeClr val="accent3"/>
+          </a:effectRef>
+          <a:fontRef idx="minor">
+            <a:schemeClr val="lt1"/>
+          </a:fontRef>
+        </p:style>
+        <p:txBody>
+          <a:bodyPr rtlCol="0" anchor="ctr"/>
+          <a:lstStyle/>
+          <a:p>
+            <a:pPr algn="ctr"/>
+            <a:endParaRPr lang="zh-TW" altLang="en-US"/>
+          </a:p>
+        </p:txBody>
+      </p:sp>
+      <p:sp>
+        <p:nvSpPr>
+          <p:cNvPr id="18" name="矩形 17"/>
+          <p:cNvSpPr/>
+          <p:nvPr/>
+        </p:nvSpPr>
+        <p:spPr>
+          <a:xfrm>
+            <a:off x="4890120" y="3645024"/>
+            <a:ext cx="648072" cy="360040"/>
+          </a:xfrm>
+          <a:prstGeom prst="rect">
+            <a:avLst/>
+          </a:prstGeom>
+        </p:spPr>
+        <p:style>
+          <a:lnRef idx="2">
+            <a:schemeClr val="accent3">
+              <a:shade val="50000"/>
+            </a:schemeClr>
+          </a:lnRef>
+          <a:fillRef idx="1">
+            <a:schemeClr val="accent3"/>
+          </a:fillRef>
+          <a:effectRef idx="0">
+            <a:schemeClr val="accent3"/>
+          </a:effectRef>
+          <a:fontRef idx="minor">
+            <a:schemeClr val="lt1"/>
+          </a:fontRef>
+        </p:style>
+        <p:txBody>
+          <a:bodyPr rtlCol="0" anchor="ctr"/>
+          <a:lstStyle/>
+          <a:p>
+            <a:pPr algn="ctr"/>
+            <a:endParaRPr lang="zh-TW" altLang="en-US"/>
+          </a:p>
+        </p:txBody>
+      </p:sp>
+      <p:sp>
+        <p:nvSpPr>
+          <p:cNvPr id="19" name="矩形 18"/>
+          <p:cNvSpPr/>
+          <p:nvPr/>
+        </p:nvSpPr>
+        <p:spPr>
+          <a:xfrm>
+            <a:off x="4890120" y="4149080"/>
+            <a:ext cx="648072" cy="360040"/>
+          </a:xfrm>
+          <a:prstGeom prst="rect">
+            <a:avLst/>
+          </a:prstGeom>
+        </p:spPr>
+        <p:style>
+          <a:lnRef idx="2">
+            <a:schemeClr val="accent3">
+              <a:shade val="50000"/>
+            </a:schemeClr>
+          </a:lnRef>
+          <a:fillRef idx="1">
+            <a:schemeClr val="accent3"/>
+          </a:fillRef>
+          <a:effectRef idx="0">
+            <a:schemeClr val="accent3"/>
+          </a:effectRef>
+          <a:fontRef idx="minor">
+            <a:schemeClr val="lt1"/>
+          </a:fontRef>
+        </p:style>
+        <p:txBody>
+          <a:bodyPr rtlCol="0" anchor="ctr"/>
+          <a:lstStyle/>
+          <a:p>
+            <a:pPr algn="ctr"/>
+            <a:endParaRPr lang="zh-TW" altLang="en-US"/>
+          </a:p>
+        </p:txBody>
+      </p:sp>
+      <p:sp>
+        <p:nvSpPr>
+          <p:cNvPr id="20" name="矩形 19"/>
+          <p:cNvSpPr/>
+          <p:nvPr/>
+        </p:nvSpPr>
+        <p:spPr>
+          <a:xfrm>
+            <a:off x="5643614" y="2636912"/>
+            <a:ext cx="648072" cy="360040"/>
+          </a:xfrm>
+          <a:prstGeom prst="rect">
+            <a:avLst/>
+          </a:prstGeom>
+        </p:spPr>
+        <p:style>
+          <a:lnRef idx="2">
+            <a:schemeClr val="accent3">
+              <a:shade val="50000"/>
+            </a:schemeClr>
+          </a:lnRef>
+          <a:fillRef idx="1">
+            <a:schemeClr val="accent3"/>
+          </a:fillRef>
+          <a:effectRef idx="0">
+            <a:schemeClr val="accent3"/>
+          </a:effectRef>
+          <a:fontRef idx="minor">
+            <a:schemeClr val="lt1"/>
+          </a:fontRef>
+        </p:style>
+        <p:txBody>
+          <a:bodyPr rtlCol="0" anchor="ctr"/>
+          <a:lstStyle/>
+          <a:p>
+            <a:pPr algn="ctr"/>
+            <a:endParaRPr lang="zh-TW" altLang="en-US"/>
+          </a:p>
+        </p:txBody>
+      </p:sp>
+      <p:sp>
+        <p:nvSpPr>
+          <p:cNvPr id="21" name="矩形 20"/>
+          <p:cNvSpPr/>
+          <p:nvPr/>
+        </p:nvSpPr>
+        <p:spPr>
+          <a:xfrm>
+            <a:off x="5643614" y="3140968"/>
+            <a:ext cx="648072" cy="360040"/>
+          </a:xfrm>
+          <a:prstGeom prst="rect">
+            <a:avLst/>
+          </a:prstGeom>
+        </p:spPr>
+        <p:style>
+          <a:lnRef idx="2">
+            <a:schemeClr val="accent3">
+              <a:shade val="50000"/>
+            </a:schemeClr>
+          </a:lnRef>
+          <a:fillRef idx="1">
+            <a:schemeClr val="accent3"/>
+          </a:fillRef>
+          <a:effectRef idx="0">
+            <a:schemeClr val="accent3"/>
+          </a:effectRef>
+          <a:fontRef idx="minor">
+            <a:schemeClr val="lt1"/>
+          </a:fontRef>
+        </p:style>
+        <p:txBody>
+          <a:bodyPr rtlCol="0" anchor="ctr"/>
+          <a:lstStyle/>
+          <a:p>
+            <a:pPr algn="ctr"/>
+            <a:endParaRPr lang="zh-TW" altLang="en-US"/>
+          </a:p>
+        </p:txBody>
+      </p:sp>
+      <p:sp>
+        <p:nvSpPr>
+          <p:cNvPr id="22" name="矩形 21"/>
+          <p:cNvSpPr/>
+          <p:nvPr/>
+        </p:nvSpPr>
+        <p:spPr>
+          <a:xfrm>
+            <a:off x="5652120" y="3645024"/>
+            <a:ext cx="648072" cy="360040"/>
+          </a:xfrm>
+          <a:prstGeom prst="rect">
+            <a:avLst/>
+          </a:prstGeom>
+        </p:spPr>
+        <p:style>
+          <a:lnRef idx="2">
+            <a:schemeClr val="accent3">
+              <a:shade val="50000"/>
+            </a:schemeClr>
+          </a:lnRef>
+          <a:fillRef idx="1">
+            <a:schemeClr val="accent3"/>
+          </a:fillRef>
+          <a:effectRef idx="0">
+            <a:schemeClr val="accent3"/>
+          </a:effectRef>
+          <a:fontRef idx="minor">
+            <a:schemeClr val="lt1"/>
+          </a:fontRef>
+        </p:style>
+        <p:txBody>
+          <a:bodyPr rtlCol="0" anchor="ctr"/>
+          <a:lstStyle/>
+          <a:p>
+            <a:pPr algn="ctr"/>
+            <a:endParaRPr lang="zh-TW" altLang="en-US"/>
+          </a:p>
+        </p:txBody>
+      </p:sp>
+      <p:sp>
+        <p:nvSpPr>
+          <p:cNvPr id="23" name="矩形 22"/>
+          <p:cNvSpPr/>
+          <p:nvPr/>
+        </p:nvSpPr>
+        <p:spPr>
+          <a:xfrm>
+            <a:off x="5643614" y="4149080"/>
+            <a:ext cx="648072" cy="360040"/>
+          </a:xfrm>
+          <a:prstGeom prst="rect">
+            <a:avLst/>
+          </a:prstGeom>
+        </p:spPr>
+        <p:style>
+          <a:lnRef idx="2">
+            <a:schemeClr val="accent3">
+              <a:shade val="50000"/>
+            </a:schemeClr>
+          </a:lnRef>
+          <a:fillRef idx="1">
+            <a:schemeClr val="accent3"/>
+          </a:fillRef>
+          <a:effectRef idx="0">
+            <a:schemeClr val="accent3"/>
+          </a:effectRef>
+          <a:fontRef idx="minor">
+            <a:schemeClr val="lt1"/>
+          </a:fontRef>
+        </p:style>
+        <p:txBody>
+          <a:bodyPr rtlCol="0" anchor="ctr"/>
+          <a:lstStyle/>
+          <a:p>
+            <a:pPr algn="ctr"/>
+            <a:endParaRPr lang="zh-TW" altLang="en-US"/>
+          </a:p>
+        </p:txBody>
+      </p:sp>
+      <p:sp>
+        <p:nvSpPr>
+          <p:cNvPr id="24" name="文字方塊 23"/>
+          <p:cNvSpPr txBox="1"/>
+          <p:nvPr/>
+        </p:nvSpPr>
+        <p:spPr>
+          <a:xfrm>
+            <a:off x="1180851" y="3284984"/>
+            <a:ext cx="1590949" cy="461665"/>
+          </a:xfrm>
+          <a:prstGeom prst="rect">
+            <a:avLst/>
+          </a:prstGeom>
+          <a:noFill/>
+        </p:spPr>
+        <p:txBody>
+          <a:bodyPr wrap="square" rtlCol="0">
+            <a:spAutoFit/>
+          </a:bodyPr>
+          <a:lstStyle/>
+          <a:p>
+            <a:pPr algn="ctr"/>
+            <a:r>
+              <a:rPr lang="en-US" altLang="zh-TW" sz="2400" dirty="0" smtClean="0"/>
+              <a:t>rows</a:t>
+            </a:r>
+            <a:endParaRPr lang="zh-TW" altLang="en-US" sz="2400" dirty="0"/>
+          </a:p>
+        </p:txBody>
+      </p:sp>
+      <p:sp>
+        <p:nvSpPr>
+          <p:cNvPr id="25" name="文字方塊 24"/>
+          <p:cNvSpPr txBox="1"/>
+          <p:nvPr/>
+        </p:nvSpPr>
+        <p:spPr>
+          <a:xfrm>
+            <a:off x="3723676" y="2060848"/>
+            <a:ext cx="1456959" cy="461665"/>
+          </a:xfrm>
+          <a:prstGeom prst="rect">
+            <a:avLst/>
+          </a:prstGeom>
+          <a:noFill/>
+        </p:spPr>
+        <p:txBody>
+          <a:bodyPr wrap="square" rtlCol="0">
+            <a:spAutoFit/>
+          </a:bodyPr>
+          <a:lstStyle/>
+          <a:p>
+            <a:pPr algn="ctr"/>
+            <a:r>
+              <a:rPr lang="en-US" altLang="zh-TW" sz="2400" dirty="0" smtClean="0"/>
+              <a:t>columns</a:t>
+            </a:r>
+            <a:endParaRPr lang="zh-TW" altLang="en-US" sz="2400" dirty="0"/>
+          </a:p>
+        </p:txBody>
+      </p:sp>
+    </p:spTree>
+    <p:extLst>
+      <p:ext uri="{BB962C8B-B14F-4D97-AF65-F5344CB8AC3E}">
+        <p14:creationId xmlns:p14="http://schemas.microsoft.com/office/powerpoint/2010/main" val="2055610792"/>
       </p:ext>
     </p:extLst>
   </p:cSld>

</xml_diff>